<commit_message>
poster and receive code updated
</commit_message>
<xml_diff>
--- a/Troy Tech - Poster/Troy Tech-Poster.pptx
+++ b/Troy Tech - Poster/Troy Tech-Poster.pptx
@@ -6291,8 +6291,8 @@
         </p:nvSpPr>
         <p:spPr>
           <a:xfrm>
-            <a:off x="530223" y="10422913"/>
-            <a:ext cx="6675630" cy="3024000"/>
+            <a:off x="457198" y="9909354"/>
+            <a:ext cx="6675630" cy="4801314"/>
           </a:xfrm>
           <a:prstGeom prst="roundRect">
             <a:avLst/>
@@ -6339,7 +6339,21 @@
                 <a:latin typeface="Arial" pitchFamily="34" charset="0"/>
                 <a:cs typeface="Arial" pitchFamily="34" charset="0"/>
               </a:rPr>
-              <a:t>HELEN V</a:t>
+              <a:t>HELEN</a:t>
+            </a:r>
+            <a:r>
+              <a:rPr lang="tr-TR" sz="3000" dirty="0">
+                <a:latin typeface="Arial" pitchFamily="34" charset="0"/>
+                <a:cs typeface="Arial" pitchFamily="34" charset="0"/>
+              </a:rPr>
+              <a:t>-</a:t>
+            </a:r>
+            <a:r>
+              <a:rPr lang="en-US" sz="3000" dirty="0">
+                <a:latin typeface="Arial" pitchFamily="34" charset="0"/>
+                <a:cs typeface="Arial" pitchFamily="34" charset="0"/>
+              </a:rPr>
+              <a:t>V</a:t>
             </a:r>
           </a:p>
           <a:p>
@@ -9462,7 +9476,7 @@
         <p:spPr>
           <a:xfrm>
             <a:off x="14539715" y="6358728"/>
-            <a:ext cx="6675630" cy="7416000"/>
+            <a:ext cx="6675630" cy="7236000"/>
           </a:xfrm>
           <a:prstGeom prst="roundRect">
             <a:avLst/>
@@ -9522,6 +9536,58 @@
               </a:rPr>
               <a:t>Holonomic Control</a:t>
             </a:r>
+            <a:endParaRPr lang="tr-TR" sz="3000" dirty="0">
+              <a:latin typeface="Arial" pitchFamily="34" charset="0"/>
+              <a:cs typeface="Arial" pitchFamily="34" charset="0"/>
+            </a:endParaRPr>
+          </a:p>
+          <a:p>
+            <a:r>
+              <a:rPr lang="tr-TR" sz="3000" dirty="0">
+                <a:latin typeface="Arial" pitchFamily="34" charset="0"/>
+                <a:cs typeface="Arial" pitchFamily="34" charset="0"/>
+              </a:rPr>
+              <a:t>	 </a:t>
+            </a:r>
+            <a:r>
+              <a:rPr lang="tr-TR" sz="3000" dirty="0" err="1">
+                <a:latin typeface="Arial" pitchFamily="34" charset="0"/>
+                <a:cs typeface="Arial" pitchFamily="34" charset="0"/>
+              </a:rPr>
+              <a:t>with</a:t>
+            </a:r>
+            <a:r>
+              <a:rPr lang="tr-TR" sz="3000" dirty="0">
+                <a:latin typeface="Arial" pitchFamily="34" charset="0"/>
+                <a:cs typeface="Arial" pitchFamily="34" charset="0"/>
+              </a:rPr>
+              <a:t> </a:t>
+            </a:r>
+            <a:r>
+              <a:rPr lang="tr-TR" sz="3000" dirty="0" err="1">
+                <a:latin typeface="Arial" pitchFamily="34" charset="0"/>
+                <a:cs typeface="Arial" pitchFamily="34" charset="0"/>
+              </a:rPr>
+              <a:t>omni</a:t>
+            </a:r>
+            <a:r>
+              <a:rPr lang="tr-TR" sz="3000" dirty="0">
+                <a:latin typeface="Arial" pitchFamily="34" charset="0"/>
+                <a:cs typeface="Arial" pitchFamily="34" charset="0"/>
+              </a:rPr>
+              <a:t> </a:t>
+            </a:r>
+            <a:r>
+              <a:rPr lang="tr-TR" sz="3000" dirty="0" err="1">
+                <a:latin typeface="Arial" pitchFamily="34" charset="0"/>
+                <a:cs typeface="Arial" pitchFamily="34" charset="0"/>
+              </a:rPr>
+              <a:t>wheels</a:t>
+            </a:r>
+            <a:endParaRPr lang="en-US" sz="3000" dirty="0">
+              <a:latin typeface="Arial" pitchFamily="34" charset="0"/>
+              <a:cs typeface="Arial" pitchFamily="34" charset="0"/>
+            </a:endParaRPr>
           </a:p>
           <a:p>
             <a:pPr marL="571500" indent="-571500">
@@ -9672,7 +9738,7 @@
         </p:blipFill>
         <p:spPr>
           <a:xfrm>
-            <a:off x="14793570" y="8342159"/>
+            <a:off x="14793570" y="8455521"/>
             <a:ext cx="6421775" cy="2191980"/>
           </a:xfrm>
           <a:prstGeom prst="rect">
@@ -9702,7 +9768,7 @@
         </p:blipFill>
         <p:spPr>
           <a:xfrm rot="10800000">
-            <a:off x="15578350" y="11623703"/>
+            <a:off x="17093578" y="11509532"/>
             <a:ext cx="1719736" cy="1289802"/>
           </a:xfrm>
           <a:prstGeom prst="rect">
@@ -9719,14 +9785,14 @@
           <p:nvPr>
             <p:extLst>
               <p:ext uri="{D42A27DB-BD31-4B8C-83A1-F6EECF244321}">
-                <p14:modId xmlns:p14="http://schemas.microsoft.com/office/powerpoint/2010/main" val="1417575006"/>
+                <p14:modId xmlns:p14="http://schemas.microsoft.com/office/powerpoint/2010/main" val="3615455408"/>
               </p:ext>
             </p:extLst>
           </p:nvPr>
         </p:nvGraphicFramePr>
         <p:xfrm>
-          <a:off x="7900198" y="22790644"/>
-          <a:ext cx="6154427" cy="4333621"/>
+          <a:off x="1065141" y="25500411"/>
+          <a:ext cx="10336884" cy="2963926"/>
         </p:xfrm>
         <a:graphic>
           <a:graphicData uri="http://schemas.openxmlformats.org/drawingml/2006/table">
@@ -9735,14 +9801,14 @@
                 <a:tableStyleId>{69012ECD-51FC-41F1-AA8D-1B2483CD663E}</a:tableStyleId>
               </a:tblPr>
               <a:tblGrid>
-                <a:gridCol w="2979829">
+                <a:gridCol w="5004876">
                   <a:extLst>
                     <a:ext uri="{9D8B030D-6E8A-4147-A177-3AD203B41FA5}">
                       <a16:colId xmlns:a16="http://schemas.microsoft.com/office/drawing/2014/main" val="20000"/>
                     </a:ext>
                   </a:extLst>
                 </a:gridCol>
-                <a:gridCol w="3174598">
+                <a:gridCol w="5332008">
                   <a:extLst>
                     <a:ext uri="{9D8B030D-6E8A-4147-A177-3AD203B41FA5}">
                       <a16:colId xmlns:a16="http://schemas.microsoft.com/office/drawing/2014/main" val="20001"/>
@@ -10817,13 +10883,13 @@
           <p:nvPr>
             <p:extLst>
               <p:ext uri="{D42A27DB-BD31-4B8C-83A1-F6EECF244321}">
-                <p14:modId xmlns:p14="http://schemas.microsoft.com/office/powerpoint/2010/main" val="3596219653"/>
+                <p14:modId xmlns:p14="http://schemas.microsoft.com/office/powerpoint/2010/main" val="2817290955"/>
               </p:ext>
             </p:extLst>
           </p:nvPr>
         </p:nvGraphicFramePr>
         <p:xfrm>
-          <a:off x="1233678" y="15226925"/>
+          <a:off x="608875" y="14973016"/>
           <a:ext cx="12382310" cy="4802143"/>
         </p:xfrm>
         <a:graphic>
@@ -11097,8 +11163,10 @@
                       <a:headEnd type="none" w="med" len="med"/>
                       <a:tailEnd type="none" w="med" len="med"/>
                     </a:lnL>
-                    <a:lnR w="12700" cap="flat" cmpd="sng" algn="ctr">
-                      <a:noFill/>
+                    <a:lnR w="9525" cap="flat" cmpd="sng" algn="ctr">
+                      <a:solidFill>
+                        <a:schemeClr val="bg1"/>
+                      </a:solidFill>
                       <a:prstDash val="solid"/>
                       <a:round/>
                       <a:headEnd type="none" w="med" len="med"/>
@@ -11176,8 +11244,14 @@
                     </a:p>
                   </a:txBody>
                   <a:tcPr marL="36000" marR="68580" marT="0" marB="0">
-                    <a:lnL>
-                      <a:noFill/>
+                    <a:lnL w="9525" cap="flat" cmpd="sng" algn="ctr">
+                      <a:solidFill>
+                        <a:schemeClr val="bg1"/>
+                      </a:solidFill>
+                      <a:prstDash val="solid"/>
+                      <a:round/>
+                      <a:headEnd type="none" w="med" len="med"/>
+                      <a:tailEnd type="none" w="med" len="med"/>
                     </a:lnL>
                     <a:lnR w="12700" cap="flat" cmpd="sng" algn="ctr">
                       <a:solidFill>
@@ -11188,6 +11262,15 @@
                       <a:headEnd type="none" w="med" len="med"/>
                       <a:tailEnd type="none" w="med" len="med"/>
                     </a:lnR>
+                    <a:lnT w="12700" cap="flat" cmpd="sng" algn="ctr">
+                      <a:solidFill>
+                        <a:schemeClr val="tx1"/>
+                      </a:solidFill>
+                      <a:prstDash val="solid"/>
+                      <a:round/>
+                      <a:headEnd type="none" w="med" len="med"/>
+                      <a:tailEnd type="none" w="med" len="med"/>
+                    </a:lnT>
                     <a:lnB w="12700" cap="flat" cmpd="sng" algn="ctr">
                       <a:solidFill>
                         <a:schemeClr val="tx1"/>
@@ -11197,6 +11280,14 @@
                       <a:headEnd type="none" w="med" len="med"/>
                       <a:tailEnd type="none" w="med" len="med"/>
                     </a:lnB>
+                    <a:lnTlToBr w="12700" cmpd="sng">
+                      <a:noFill/>
+                      <a:prstDash val="solid"/>
+                    </a:lnTlToBr>
+                    <a:lnBlToTr w="12700" cmpd="sng">
+                      <a:noFill/>
+                      <a:prstDash val="solid"/>
+                    </a:lnBlToTr>
                     <a:solidFill>
                       <a:srgbClr val="4A66AC"/>
                     </a:solidFill>
@@ -13570,14 +13661,14 @@
           <p:nvPr>
             <p:extLst>
               <p:ext uri="{D42A27DB-BD31-4B8C-83A1-F6EECF244321}">
-                <p14:modId xmlns:p14="http://schemas.microsoft.com/office/powerpoint/2010/main" val="1523477823"/>
+                <p14:modId xmlns:p14="http://schemas.microsoft.com/office/powerpoint/2010/main" val="1435994556"/>
               </p:ext>
             </p:extLst>
           </p:nvPr>
         </p:nvGraphicFramePr>
         <p:xfrm>
-          <a:off x="1053946" y="22790644"/>
-          <a:ext cx="6520954" cy="5769610"/>
+          <a:off x="608875" y="19969686"/>
+          <a:ext cx="9811245" cy="4399915"/>
         </p:xfrm>
         <a:graphic>
           <a:graphicData uri="http://schemas.openxmlformats.org/drawingml/2006/table">
@@ -13586,7 +13677,7 @@
                 <a:tableStyleId>{69012ECD-51FC-41F1-AA8D-1B2483CD663E}</a:tableStyleId>
               </a:tblPr>
               <a:tblGrid>
-                <a:gridCol w="6520954">
+                <a:gridCol w="9811245">
                   <a:extLst>
                     <a:ext uri="{9D8B030D-6E8A-4147-A177-3AD203B41FA5}">
                       <a16:colId xmlns:a16="http://schemas.microsoft.com/office/drawing/2014/main" val="20000"/>

</xml_diff>